<commit_message>
Modify the slides for A1 and Lec. 4.
</commit_message>
<xml_diff>
--- a/Assignments/A1/1#Assignment.pptx
+++ b/Assignments/A1/1#Assignment.pptx
@@ -207,7 +207,7 @@
           <a:p>
             <a:fld id="{AA66A5E4-2F90-4B56-BDEB-27100CBC5233}" type="datetimeFigureOut">
               <a:rPr lang="zh-CN" altLang="en-US" smtClean="0"/>
-              <a:t>2014/4/3</a:t>
+              <a:t>2014/4/8</a:t>
             </a:fld>
             <a:endParaRPr lang="zh-CN" altLang="en-US"/>
           </a:p>
@@ -1026,7 +1026,7 @@
           <a:p>
             <a:fld id="{4BBE7AE2-8C73-4028-8151-77B8842EA71D}" type="datetimeFigureOut">
               <a:rPr lang="zh-CN" altLang="en-US" smtClean="0"/>
-              <a:t>2014/4/3</a:t>
+              <a:t>2014/4/8</a:t>
             </a:fld>
             <a:endParaRPr lang="zh-CN" altLang="en-US"/>
           </a:p>
@@ -1196,7 +1196,7 @@
           <a:p>
             <a:fld id="{4BBE7AE2-8C73-4028-8151-77B8842EA71D}" type="datetimeFigureOut">
               <a:rPr lang="zh-CN" altLang="en-US" smtClean="0"/>
-              <a:t>2014/4/3</a:t>
+              <a:t>2014/4/8</a:t>
             </a:fld>
             <a:endParaRPr lang="zh-CN" altLang="en-US"/>
           </a:p>
@@ -1376,7 +1376,7 @@
           <a:p>
             <a:fld id="{4BBE7AE2-8C73-4028-8151-77B8842EA71D}" type="datetimeFigureOut">
               <a:rPr lang="zh-CN" altLang="en-US" smtClean="0"/>
-              <a:t>2014/4/3</a:t>
+              <a:t>2014/4/8</a:t>
             </a:fld>
             <a:endParaRPr lang="zh-CN" altLang="en-US"/>
           </a:p>
@@ -1546,7 +1546,7 @@
           <a:p>
             <a:fld id="{4BBE7AE2-8C73-4028-8151-77B8842EA71D}" type="datetimeFigureOut">
               <a:rPr lang="zh-CN" altLang="en-US" smtClean="0"/>
-              <a:t>2014/4/3</a:t>
+              <a:t>2014/4/8</a:t>
             </a:fld>
             <a:endParaRPr lang="zh-CN" altLang="en-US"/>
           </a:p>
@@ -1790,7 +1790,7 @@
           <a:p>
             <a:fld id="{4BBE7AE2-8C73-4028-8151-77B8842EA71D}" type="datetimeFigureOut">
               <a:rPr lang="zh-CN" altLang="en-US" smtClean="0"/>
-              <a:t>2014/4/3</a:t>
+              <a:t>2014/4/8</a:t>
             </a:fld>
             <a:endParaRPr lang="zh-CN" altLang="en-US"/>
           </a:p>
@@ -2022,7 +2022,7 @@
           <a:p>
             <a:fld id="{4BBE7AE2-8C73-4028-8151-77B8842EA71D}" type="datetimeFigureOut">
               <a:rPr lang="zh-CN" altLang="en-US" smtClean="0"/>
-              <a:t>2014/4/3</a:t>
+              <a:t>2014/4/8</a:t>
             </a:fld>
             <a:endParaRPr lang="zh-CN" altLang="en-US"/>
           </a:p>
@@ -2389,7 +2389,7 @@
           <a:p>
             <a:fld id="{4BBE7AE2-8C73-4028-8151-77B8842EA71D}" type="datetimeFigureOut">
               <a:rPr lang="zh-CN" altLang="en-US" smtClean="0"/>
-              <a:t>2014/4/3</a:t>
+              <a:t>2014/4/8</a:t>
             </a:fld>
             <a:endParaRPr lang="zh-CN" altLang="en-US"/>
           </a:p>
@@ -2507,7 +2507,7 @@
           <a:p>
             <a:fld id="{4BBE7AE2-8C73-4028-8151-77B8842EA71D}" type="datetimeFigureOut">
               <a:rPr lang="zh-CN" altLang="en-US" smtClean="0"/>
-              <a:t>2014/4/3</a:t>
+              <a:t>2014/4/8</a:t>
             </a:fld>
             <a:endParaRPr lang="zh-CN" altLang="en-US"/>
           </a:p>
@@ -2602,7 +2602,7 @@
           <a:p>
             <a:fld id="{4BBE7AE2-8C73-4028-8151-77B8842EA71D}" type="datetimeFigureOut">
               <a:rPr lang="zh-CN" altLang="en-US" smtClean="0"/>
-              <a:t>2014/4/3</a:t>
+              <a:t>2014/4/8</a:t>
             </a:fld>
             <a:endParaRPr lang="zh-CN" altLang="en-US"/>
           </a:p>
@@ -2879,7 +2879,7 @@
           <a:p>
             <a:fld id="{4BBE7AE2-8C73-4028-8151-77B8842EA71D}" type="datetimeFigureOut">
               <a:rPr lang="zh-CN" altLang="en-US" smtClean="0"/>
-              <a:t>2014/4/3</a:t>
+              <a:t>2014/4/8</a:t>
             </a:fld>
             <a:endParaRPr lang="zh-CN" altLang="en-US"/>
           </a:p>
@@ -3136,7 +3136,7 @@
           <a:p>
             <a:fld id="{4BBE7AE2-8C73-4028-8151-77B8842EA71D}" type="datetimeFigureOut">
               <a:rPr lang="zh-CN" altLang="en-US" smtClean="0"/>
-              <a:t>2014/4/3</a:t>
+              <a:t>2014/4/8</a:t>
             </a:fld>
             <a:endParaRPr lang="zh-CN" altLang="en-US"/>
           </a:p>
@@ -3349,7 +3349,7 @@
           <a:p>
             <a:fld id="{4BBE7AE2-8C73-4028-8151-77B8842EA71D}" type="datetimeFigureOut">
               <a:rPr lang="zh-CN" altLang="en-US" smtClean="0"/>
-              <a:t>2014/4/3</a:t>
+              <a:t>2014/4/8</a:t>
             </a:fld>
             <a:endParaRPr lang="zh-CN" altLang="en-US"/>
           </a:p>
@@ -4255,13 +4255,13 @@
   <p:clrMapOvr>
     <a:masterClrMapping/>
   </p:clrMapOvr>
-  <mc:AlternateContent xmlns:mc="http://schemas.openxmlformats.org/markup-compatibility/2006">
-    <mc:Choice xmlns:p14="http://schemas.microsoft.com/office/powerpoint/2010/main" Requires="p14">
+  <mc:AlternateContent xmlns:mc="http://schemas.openxmlformats.org/markup-compatibility/2006" xmlns:p14="http://schemas.microsoft.com/office/powerpoint/2010/main">
+    <mc:Choice Requires="p14">
       <p:transition spd="slow" p14:dur="800">
         <p14:flythrough/>
       </p:transition>
     </mc:Choice>
-    <mc:Fallback>
+    <mc:Fallback xmlns="">
       <p:transition spd="slow">
         <p:fade/>
       </p:transition>
@@ -4559,13 +4559,13 @@
   <p:clrMapOvr>
     <a:masterClrMapping/>
   </p:clrMapOvr>
-  <mc:AlternateContent xmlns:mc="http://schemas.openxmlformats.org/markup-compatibility/2006">
-    <mc:Choice xmlns:p15="http://schemas.microsoft.com/office/powerpoint/2012/main" Requires="p15">
+  <mc:AlternateContent xmlns:mc="http://schemas.openxmlformats.org/markup-compatibility/2006" xmlns:p15="http://schemas.microsoft.com/office/powerpoint/2012/main">
+    <mc:Choice Requires="p15">
       <p:transition xmlns:p14="http://schemas.microsoft.com/office/powerpoint/2010/main" spd="slow" p14:dur="2000">
         <p15:prstTrans prst="crush"/>
       </p:transition>
     </mc:Choice>
-    <mc:Fallback>
+    <mc:Fallback xmlns="">
       <p:transition spd="slow">
         <p:fade/>
       </p:transition>
@@ -5216,15 +5216,11 @@
     <a:masterClrMapping/>
   </p:clrMapOvr>
   <mc:AlternateContent xmlns:mc="http://schemas.openxmlformats.org/markup-compatibility/2006">
-    <mc:Choice xmlns:p15="http://schemas.microsoft.com/office/powerpoint/2012/main" Requires="p15">
-      <p:transition xmlns:p14="http://schemas.microsoft.com/office/powerpoint/2010/main" spd="slow" p14:dur="2000">
-        <p15:prstTrans prst="crush"/>
-      </p:transition>
+    <mc:Choice xmlns:p14="http://schemas.microsoft.com/office/powerpoint/2010/main" Requires="p14">
+      <p:transition p14:dur="0"/>
     </mc:Choice>
     <mc:Fallback>
-      <p:transition spd="slow">
-        <p:fade/>
-      </p:transition>
+      <p:transition/>
     </mc:Fallback>
   </mc:AlternateContent>
   <p:timing>
@@ -5461,13 +5457,13 @@
   <p:clrMapOvr>
     <a:masterClrMapping/>
   </p:clrMapOvr>
-  <mc:AlternateContent xmlns:mc="http://schemas.openxmlformats.org/markup-compatibility/2006">
-    <mc:Choice xmlns:p15="http://schemas.microsoft.com/office/powerpoint/2012/main" Requires="p15">
+  <mc:AlternateContent xmlns:mc="http://schemas.openxmlformats.org/markup-compatibility/2006" xmlns:p15="http://schemas.microsoft.com/office/powerpoint/2012/main">
+    <mc:Choice Requires="p15">
       <p:transition xmlns:p14="http://schemas.microsoft.com/office/powerpoint/2010/main" spd="slow" p14:dur="1250">
         <p15:prstTrans prst="pageCurlDouble"/>
       </p:transition>
     </mc:Choice>
-    <mc:Fallback>
+    <mc:Fallback xmlns="">
       <p:transition spd="slow">
         <p:fade/>
       </p:transition>
@@ -5866,13 +5862,13 @@
   <p:clrMapOvr>
     <a:masterClrMapping/>
   </p:clrMapOvr>
-  <mc:AlternateContent xmlns:mc="http://schemas.openxmlformats.org/markup-compatibility/2006">
-    <mc:Choice xmlns:p15="http://schemas.microsoft.com/office/powerpoint/2012/main" Requires="p15">
+  <mc:AlternateContent xmlns:mc="http://schemas.openxmlformats.org/markup-compatibility/2006" xmlns:p15="http://schemas.microsoft.com/office/powerpoint/2012/main">
+    <mc:Choice Requires="p15">
       <p:transition xmlns:p14="http://schemas.microsoft.com/office/powerpoint/2010/main" spd="slow" p14:dur="2000">
         <p15:prstTrans prst="fracture"/>
       </p:transition>
     </mc:Choice>
-    <mc:Fallback>
+    <mc:Fallback xmlns="">
       <p:transition spd="slow">
         <p:fade/>
       </p:transition>
@@ -6002,7 +5998,31 @@
                 </a:solidFill>
                 <a:latin typeface="+mn-lt"/>
               </a:rPr>
-              <a:t>, presented in lectures should be demonstrated in your implementation</a:t>
+              <a:t>, </a:t>
+            </a:r>
+            <a:r>
+              <a:rPr lang="en-US" sz="3200" dirty="0" smtClean="0">
+                <a:solidFill>
+                  <a:schemeClr val="tx1">
+                    <a:lumMod val="95000"/>
+                    <a:lumOff val="5000"/>
+                  </a:schemeClr>
+                </a:solidFill>
+                <a:latin typeface="+mn-lt"/>
+              </a:rPr>
+              <a:t>addressed in </a:t>
+            </a:r>
+            <a:r>
+              <a:rPr lang="en-US" sz="3200" dirty="0" smtClean="0">
+                <a:solidFill>
+                  <a:schemeClr val="tx1">
+                    <a:lumMod val="95000"/>
+                    <a:lumOff val="5000"/>
+                  </a:schemeClr>
+                </a:solidFill>
+                <a:latin typeface="+mn-lt"/>
+              </a:rPr>
+              <a:t>lectures should be demonstrated in your implementation</a:t>
             </a:r>
           </a:p>
           <a:p>
@@ -6127,13 +6147,13 @@
   <p:clrMapOvr>
     <a:masterClrMapping/>
   </p:clrMapOvr>
-  <mc:AlternateContent xmlns:mc="http://schemas.openxmlformats.org/markup-compatibility/2006">
-    <mc:Choice xmlns:p15="http://schemas.microsoft.com/office/powerpoint/2012/main" Requires="p15">
+  <mc:AlternateContent xmlns:mc="http://schemas.openxmlformats.org/markup-compatibility/2006" xmlns:p15="http://schemas.microsoft.com/office/powerpoint/2012/main">
+    <mc:Choice Requires="p15">
       <p:transition xmlns:p14="http://schemas.microsoft.com/office/powerpoint/2010/main" spd="slow" p14:dur="2000">
         <p15:prstTrans prst="drape"/>
       </p:transition>
     </mc:Choice>
-    <mc:Fallback>
+    <mc:Fallback xmlns="">
       <p:transition spd="slow">
         <p:fade/>
       </p:transition>
@@ -6224,7 +6244,39 @@
               <a:t>Either </a:t>
             </a:r>
             <a:r>
-              <a:rPr lang="en-US" sz="3200" dirty="0" err="1" smtClean="0">
+              <a:rPr lang="en-US" sz="3200" i="1" dirty="0" err="1" smtClean="0">
+                <a:solidFill>
+                  <a:srgbClr val="00B050"/>
+                </a:solidFill>
+                <a:effectLst>
+                  <a:outerShdw blurRad="38100" dist="38100" dir="2700000" algn="tl">
+                    <a:srgbClr val="000000">
+                      <a:alpha val="43137"/>
+                    </a:srgbClr>
+                  </a:outerShdw>
+                </a:effectLst>
+                <a:latin typeface="+mn-lt"/>
+              </a:rPr>
+              <a:t>Matlab</a:t>
+            </a:r>
+            <a:r>
+              <a:rPr lang="en-US" sz="3200" dirty="0" smtClean="0">
+                <a:solidFill>
+                  <a:srgbClr val="00B050"/>
+                </a:solidFill>
+                <a:effectLst>
+                  <a:outerShdw blurRad="38100" dist="38100" dir="2700000" algn="tl">
+                    <a:srgbClr val="000000">
+                      <a:alpha val="43137"/>
+                    </a:srgbClr>
+                  </a:outerShdw>
+                </a:effectLst>
+                <a:latin typeface="+mn-lt"/>
+              </a:rPr>
+              <a:t> </a:t>
+            </a:r>
+            <a:r>
+              <a:rPr lang="en-US" sz="3200" dirty="0" smtClean="0">
                 <a:solidFill>
                   <a:schemeClr val="tx1">
                     <a:lumMod val="95000"/>
@@ -6233,7 +6285,23 @@
                 </a:solidFill>
                 <a:latin typeface="+mn-lt"/>
               </a:rPr>
-              <a:t>Matlab</a:t>
+              <a:t>or </a:t>
+            </a:r>
+            <a:r>
+              <a:rPr lang="en-US" sz="3200" i="1" dirty="0" smtClean="0">
+                <a:solidFill>
+                  <a:srgbClr val="00B050"/>
+                </a:solidFill>
+                <a:effectLst>
+                  <a:outerShdw blurRad="38100" dist="38100" dir="2700000" algn="tl">
+                    <a:srgbClr val="000000">
+                      <a:alpha val="43137"/>
+                    </a:srgbClr>
+                  </a:outerShdw>
+                </a:effectLst>
+                <a:latin typeface="+mn-lt"/>
+              </a:rPr>
+              <a:t>Octave</a:t>
             </a:r>
             <a:r>
               <a:rPr lang="en-US" sz="3200" dirty="0" smtClean="0">
@@ -6245,7 +6313,7 @@
                 </a:solidFill>
                 <a:latin typeface="+mn-lt"/>
               </a:rPr>
-              <a:t> or Octave can be used in programming.</a:t>
+              <a:t> can be used in programming.</a:t>
             </a:r>
           </a:p>
           <a:p>
@@ -6406,13 +6474,13 @@
   <p:clrMapOvr>
     <a:masterClrMapping/>
   </p:clrMapOvr>
-  <mc:AlternateContent xmlns:mc="http://schemas.openxmlformats.org/markup-compatibility/2006">
-    <mc:Choice xmlns:p15="http://schemas.microsoft.com/office/powerpoint/2012/main" Requires="p15">
+  <mc:AlternateContent xmlns:mc="http://schemas.openxmlformats.org/markup-compatibility/2006" xmlns:p15="http://schemas.microsoft.com/office/powerpoint/2012/main">
+    <mc:Choice Requires="p15">
       <p:transition xmlns:p14="http://schemas.microsoft.com/office/powerpoint/2010/main" spd="slow" p14:dur="2000">
         <p15:prstTrans prst="prestige"/>
       </p:transition>
     </mc:Choice>
-    <mc:Fallback>
+    <mc:Fallback xmlns="">
       <p:transition spd="slow">
         <p:fade/>
       </p:transition>
@@ -6518,7 +6586,47 @@
                 </a:solidFill>
                 <a:latin typeface="+mn-lt"/>
               </a:rPr>
-              <a:t>It makes no sense and </a:t>
+              <a:t>It makes </a:t>
+            </a:r>
+            <a:r>
+              <a:rPr lang="en-US" sz="3200" b="1" i="1" dirty="0">
+                <a:solidFill>
+                  <a:srgbClr val="FF0000"/>
+                </a:solidFill>
+                <a:effectLst>
+                  <a:outerShdw blurRad="38100" dist="38100" dir="2700000" algn="tl">
+                    <a:srgbClr val="000000">
+                      <a:alpha val="43137"/>
+                    </a:srgbClr>
+                  </a:outerShdw>
+                </a:effectLst>
+                <a:latin typeface="+mn-lt"/>
+              </a:rPr>
+              <a:t>NO</a:t>
+            </a:r>
+            <a:r>
+              <a:rPr lang="en-US" sz="3200" dirty="0" smtClean="0">
+                <a:solidFill>
+                  <a:schemeClr val="tx1">
+                    <a:lumMod val="95000"/>
+                    <a:lumOff val="5000"/>
+                  </a:schemeClr>
+                </a:solidFill>
+                <a:latin typeface="+mn-lt"/>
+              </a:rPr>
+              <a:t> </a:t>
+            </a:r>
+            <a:r>
+              <a:rPr lang="en-US" sz="3200" dirty="0" smtClean="0">
+                <a:solidFill>
+                  <a:schemeClr val="tx1">
+                    <a:lumMod val="95000"/>
+                    <a:lumOff val="5000"/>
+                  </a:schemeClr>
+                </a:solidFill>
+                <a:latin typeface="+mn-lt"/>
+              </a:rPr>
+              <a:t>sense and </a:t>
             </a:r>
             <a:r>
               <a:rPr lang="en-US" sz="3200" b="1" i="1" dirty="0" smtClean="0">
@@ -6713,13 +6821,13 @@
   <p:clrMapOvr>
     <a:masterClrMapping/>
   </p:clrMapOvr>
-  <mc:AlternateContent xmlns:mc="http://schemas.openxmlformats.org/markup-compatibility/2006">
-    <mc:Choice xmlns:p15="http://schemas.microsoft.com/office/powerpoint/2012/main" Requires="p15">
+  <mc:AlternateContent xmlns:mc="http://schemas.openxmlformats.org/markup-compatibility/2006" xmlns:p15="http://schemas.microsoft.com/office/powerpoint/2012/main">
+    <mc:Choice Requires="p15">
       <p:transition xmlns:p14="http://schemas.microsoft.com/office/powerpoint/2010/main" spd="slow" p14:dur="1250">
         <p15:prstTrans prst="peelOff"/>
       </p:transition>
     </mc:Choice>
-    <mc:Fallback>
+    <mc:Fallback xmlns="">
       <p:transition spd="slow">
         <p:fade/>
       </p:transition>
@@ -6762,8 +6870,8 @@
         </p:nvSpPr>
         <p:spPr>
           <a:xfrm>
-            <a:off x="394701" y="1720232"/>
-            <a:ext cx="8455683" cy="4378564"/>
+            <a:off x="591771" y="1451487"/>
+            <a:ext cx="5704986" cy="1367097"/>
           </a:xfrm>
           <a:prstGeom prst="rect">
             <a:avLst/>
@@ -6807,12 +6915,10 @@
                 </a:solidFill>
                 <a:latin typeface="+mn-lt"/>
               </a:rPr>
-              <a:t>Package your codes and documents in a single compressed file titled as:</a:t>
-            </a:r>
-          </a:p>
-          <a:p>
-            <a:r>
-              <a:rPr lang="en-US" sz="3200" dirty="0">
+              <a:t>Package your codes and </a:t>
+            </a:r>
+            <a:r>
+              <a:rPr lang="en-US" sz="3200" dirty="0" smtClean="0">
                 <a:solidFill>
                   <a:schemeClr val="tx1">
                     <a:lumMod val="95000"/>
@@ -6821,7 +6927,7 @@
                 </a:solidFill>
                 <a:latin typeface="+mn-lt"/>
               </a:rPr>
-              <a:t> </a:t>
+              <a:t>document </a:t>
             </a:r>
             <a:r>
               <a:rPr lang="en-US" sz="3200" dirty="0" smtClean="0">
@@ -6833,10 +6939,12 @@
                 </a:solidFill>
                 <a:latin typeface="+mn-lt"/>
               </a:rPr>
-              <a:t>    ML_ASS1#_your </a:t>
-            </a:r>
-            <a:r>
-              <a:rPr lang="en-US" sz="3200" dirty="0" err="1" smtClean="0">
+              <a:t>in a single compressed file titled as:</a:t>
+            </a:r>
+          </a:p>
+          <a:p>
+            <a:r>
+              <a:rPr lang="en-US" sz="3200" dirty="0">
                 <a:solidFill>
                   <a:schemeClr val="tx1">
                     <a:lumMod val="95000"/>
@@ -6845,7 +6953,7 @@
                 </a:solidFill>
                 <a:latin typeface="+mn-lt"/>
               </a:rPr>
-              <a:t>name_your</a:t>
+              <a:t> </a:t>
             </a:r>
             <a:r>
               <a:rPr lang="en-US" sz="3200" dirty="0" smtClean="0">
@@ -6857,213 +6965,8 @@
                 </a:solidFill>
                 <a:latin typeface="+mn-lt"/>
               </a:rPr>
-              <a:t> ID, for example:</a:t>
-            </a:r>
-          </a:p>
-          <a:p>
-            <a:r>
-              <a:rPr lang="en-US" sz="3200" dirty="0">
-                <a:solidFill>
-                  <a:schemeClr val="tx1">
-                    <a:lumMod val="95000"/>
-                    <a:lumOff val="5000"/>
-                  </a:schemeClr>
-                </a:solidFill>
-                <a:latin typeface="+mn-lt"/>
-              </a:rPr>
-              <a:t> </a:t>
-            </a:r>
-            <a:r>
-              <a:rPr lang="en-US" sz="3200" dirty="0" smtClean="0">
-                <a:solidFill>
-                  <a:schemeClr val="tx1">
-                    <a:lumMod val="95000"/>
-                    <a:lumOff val="5000"/>
-                  </a:schemeClr>
-                </a:solidFill>
-                <a:latin typeface="+mn-lt"/>
-              </a:rPr>
-              <a:t>    ML_ASS1#_</a:t>
-            </a:r>
-            <a:r>
-              <a:rPr lang="zh-CN" altLang="en-US" sz="3200" dirty="0" smtClean="0">
-                <a:solidFill>
-                  <a:schemeClr val="tx1">
-                    <a:lumMod val="95000"/>
-                    <a:lumOff val="5000"/>
-                  </a:schemeClr>
-                </a:solidFill>
-                <a:latin typeface="+mn-lt"/>
-              </a:rPr>
-              <a:t>马伊俐</a:t>
-            </a:r>
-            <a:r>
-              <a:rPr lang="en-US" altLang="zh-CN" sz="3200" dirty="0" smtClean="0">
-                <a:solidFill>
-                  <a:schemeClr val="tx1">
-                    <a:lumMod val="95000"/>
-                    <a:lumOff val="5000"/>
-                  </a:schemeClr>
-                </a:solidFill>
-                <a:latin typeface="+mn-lt"/>
-              </a:rPr>
-              <a:t>_19970188</a:t>
-            </a:r>
-            <a:endParaRPr lang="en-US" sz="3200" dirty="0" smtClean="0">
-              <a:solidFill>
-                <a:schemeClr val="tx1">
-                  <a:lumMod val="95000"/>
-                  <a:lumOff val="5000"/>
-                </a:schemeClr>
-              </a:solidFill>
-              <a:latin typeface="+mn-lt"/>
-            </a:endParaRPr>
-          </a:p>
-          <a:p>
-            <a:pPr marL="457200" indent="-457200">
-              <a:buFont typeface="Wingdings" panose="05000000000000000000" pitchFamily="2" charset="2"/>
-              <a:buChar char="l"/>
-            </a:pPr>
-            <a:r>
-              <a:rPr lang="en-US" sz="3200" dirty="0">
-                <a:solidFill>
-                  <a:schemeClr val="tx1">
-                    <a:lumMod val="95000"/>
-                    <a:lumOff val="5000"/>
-                  </a:schemeClr>
-                </a:solidFill>
-                <a:latin typeface="+mn-lt"/>
-              </a:rPr>
-              <a:t>S</a:t>
-            </a:r>
-            <a:r>
-              <a:rPr lang="en-US" sz="3200" dirty="0" smtClean="0">
-                <a:solidFill>
-                  <a:schemeClr val="tx1">
-                    <a:lumMod val="95000"/>
-                    <a:lumOff val="5000"/>
-                  </a:schemeClr>
-                </a:solidFill>
-                <a:latin typeface="+mn-lt"/>
-              </a:rPr>
-              <a:t>end it as attachment to </a:t>
-            </a:r>
-          </a:p>
-          <a:p>
-            <a:r>
-              <a:rPr lang="en-US" sz="3200" dirty="0">
-                <a:solidFill>
-                  <a:schemeClr val="tx1">
-                    <a:lumMod val="95000"/>
-                    <a:lumOff val="5000"/>
-                  </a:schemeClr>
-                </a:solidFill>
-                <a:latin typeface="+mn-lt"/>
-              </a:rPr>
-              <a:t>	</a:t>
-            </a:r>
-            <a:r>
-              <a:rPr lang="en-US" sz="3200" dirty="0" smtClean="0">
-                <a:solidFill>
-                  <a:schemeClr val="tx1">
-                    <a:lumMod val="95000"/>
-                    <a:lumOff val="5000"/>
-                  </a:schemeClr>
-                </a:solidFill>
-                <a:latin typeface="+mn-lt"/>
-                <a:hlinkClick r:id="rId3"/>
-              </a:rPr>
-              <a:t>assignments.shumtu@gmail.com</a:t>
-            </a:r>
-            <a:r>
-              <a:rPr lang="en-US" sz="3200" dirty="0" smtClean="0">
-                <a:solidFill>
-                  <a:schemeClr val="tx1">
-                    <a:lumMod val="95000"/>
-                    <a:lumOff val="5000"/>
-                  </a:schemeClr>
-                </a:solidFill>
-                <a:latin typeface="+mn-lt"/>
-              </a:rPr>
-              <a:t> </a:t>
-            </a:r>
-          </a:p>
-          <a:p>
-            <a:pPr marL="457200" lvl="0" indent="-457200">
-              <a:lnSpc>
-                <a:spcPct val="100000"/>
-              </a:lnSpc>
-              <a:spcBef>
-                <a:spcPts val="0"/>
-              </a:spcBef>
-              <a:buFont typeface="Wingdings" panose="05000000000000000000" pitchFamily="2" charset="2"/>
-              <a:buChar char="l"/>
-            </a:pPr>
-            <a:r>
-              <a:rPr lang="en-US" altLang="zh-CN" sz="3200" dirty="0" smtClean="0">
-                <a:solidFill>
-                  <a:prstClr val="black">
-                    <a:lumMod val="95000"/>
-                    <a:lumOff val="5000"/>
-                  </a:prstClr>
-                </a:solidFill>
-                <a:latin typeface="Calibri" panose="020F0502020204030204"/>
-                <a:ea typeface="+mn-ea"/>
-                <a:cs typeface="+mn-cs"/>
-              </a:rPr>
-              <a:t>The subject of the email should be the same as the name of your attachment.</a:t>
-            </a:r>
-          </a:p>
-          <a:p>
-            <a:pPr marL="457200" lvl="0" indent="-457200">
-              <a:lnSpc>
-                <a:spcPct val="100000"/>
-              </a:lnSpc>
-              <a:spcBef>
-                <a:spcPts val="0"/>
-              </a:spcBef>
-              <a:buFont typeface="Wingdings" panose="05000000000000000000" pitchFamily="2" charset="2"/>
-              <a:buChar char="l"/>
-            </a:pPr>
-            <a:r>
-              <a:rPr lang="en-US" altLang="zh-CN" sz="3200" dirty="0" smtClean="0">
-                <a:solidFill>
-                  <a:prstClr val="black">
-                    <a:lumMod val="95000"/>
-                    <a:lumOff val="5000"/>
-                  </a:prstClr>
-                </a:solidFill>
-                <a:latin typeface="Calibri" panose="020F0502020204030204"/>
-                <a:ea typeface="+mn-ea"/>
-                <a:cs typeface="+mn-cs"/>
-              </a:rPr>
-              <a:t>Any email with mismatched formats will be treated as SPAM</a:t>
-            </a:r>
-            <a:r>
-              <a:rPr lang="en-US" altLang="zh-CN" sz="3200" dirty="0">
-                <a:solidFill>
-                  <a:prstClr val="black">
-                    <a:lumMod val="95000"/>
-                    <a:lumOff val="5000"/>
-                  </a:prstClr>
-                </a:solidFill>
-                <a:latin typeface="Calibri" panose="020F0502020204030204"/>
-                <a:ea typeface="+mn-ea"/>
-                <a:cs typeface="+mn-cs"/>
-              </a:rPr>
-              <a:t>.</a:t>
-            </a:r>
-          </a:p>
-          <a:p>
-            <a:endParaRPr lang="en-US" sz="3200" dirty="0" smtClean="0">
-              <a:solidFill>
-                <a:schemeClr val="tx1">
-                  <a:lumMod val="95000"/>
-                  <a:lumOff val="5000"/>
-                </a:schemeClr>
-              </a:solidFill>
-              <a:latin typeface="+mn-lt"/>
-            </a:endParaRPr>
+              <a:t>    </a:t>
+            </a:r>
           </a:p>
         </p:txBody>
       </p:sp>
@@ -7159,6 +7062,322 @@
           </a:p>
         </p:txBody>
       </p:sp>
+      <p:sp>
+        <p:nvSpPr>
+          <p:cNvPr id="6" name="矩形 5"/>
+          <p:cNvSpPr/>
+          <p:nvPr/>
+        </p:nvSpPr>
+        <p:spPr>
+          <a:xfrm>
+            <a:off x="653845" y="2784987"/>
+            <a:ext cx="8093916" cy="4031873"/>
+          </a:xfrm>
+          <a:prstGeom prst="rect">
+            <a:avLst/>
+          </a:prstGeom>
+        </p:spPr>
+        <p:txBody>
+          <a:bodyPr wrap="square">
+            <a:spAutoFit/>
+          </a:bodyPr>
+          <a:lstStyle/>
+          <a:p>
+            <a:pPr lvl="0"/>
+            <a:r>
+              <a:rPr lang="en-US" altLang="zh-CN" sz="3200" dirty="0">
+                <a:solidFill>
+                  <a:prstClr val="black">
+                    <a:lumMod val="95000"/>
+                    <a:lumOff val="5000"/>
+                  </a:prstClr>
+                </a:solidFill>
+              </a:rPr>
+              <a:t> </a:t>
+            </a:r>
+            <a:r>
+              <a:rPr lang="en-US" altLang="zh-CN" sz="3200" dirty="0" smtClean="0">
+                <a:solidFill>
+                  <a:prstClr val="black">
+                    <a:lumMod val="95000"/>
+                    <a:lumOff val="5000"/>
+                  </a:prstClr>
+                </a:solidFill>
+              </a:rPr>
+              <a:t>    ML_ASS1</a:t>
+            </a:r>
+            <a:r>
+              <a:rPr lang="en-US" altLang="zh-CN" sz="3200" dirty="0">
+                <a:solidFill>
+                  <a:prstClr val="black">
+                    <a:lumMod val="95000"/>
+                    <a:lumOff val="5000"/>
+                  </a:prstClr>
+                </a:solidFill>
+              </a:rPr>
+              <a:t>#_your </a:t>
+            </a:r>
+            <a:r>
+              <a:rPr lang="en-US" altLang="zh-CN" sz="3200" dirty="0" err="1">
+                <a:solidFill>
+                  <a:prstClr val="black">
+                    <a:lumMod val="95000"/>
+                    <a:lumOff val="5000"/>
+                  </a:prstClr>
+                </a:solidFill>
+              </a:rPr>
+              <a:t>name_your</a:t>
+            </a:r>
+            <a:r>
+              <a:rPr lang="en-US" altLang="zh-CN" sz="3200" dirty="0">
+                <a:solidFill>
+                  <a:prstClr val="black">
+                    <a:lumMod val="95000"/>
+                    <a:lumOff val="5000"/>
+                  </a:prstClr>
+                </a:solidFill>
+              </a:rPr>
+              <a:t> ID, </a:t>
+            </a:r>
+            <a:r>
+              <a:rPr lang="en-US" altLang="zh-CN" sz="3200" dirty="0" smtClean="0">
+                <a:solidFill>
+                  <a:prstClr val="black">
+                    <a:lumMod val="95000"/>
+                    <a:lumOff val="5000"/>
+                  </a:prstClr>
+                </a:solidFill>
+              </a:rPr>
+              <a:t>for </a:t>
+            </a:r>
+            <a:r>
+              <a:rPr lang="en-US" altLang="zh-CN" sz="3200" dirty="0">
+                <a:solidFill>
+                  <a:prstClr val="black">
+                    <a:lumMod val="95000"/>
+                    <a:lumOff val="5000"/>
+                  </a:prstClr>
+                </a:solidFill>
+              </a:rPr>
+              <a:t>example:</a:t>
+            </a:r>
+          </a:p>
+          <a:p>
+            <a:pPr lvl="0"/>
+            <a:r>
+              <a:rPr lang="en-US" altLang="zh-CN" sz="3200" dirty="0">
+                <a:solidFill>
+                  <a:prstClr val="black">
+                    <a:lumMod val="95000"/>
+                    <a:lumOff val="5000"/>
+                  </a:prstClr>
+                </a:solidFill>
+              </a:rPr>
+              <a:t>     ML_ASS1#_</a:t>
+            </a:r>
+            <a:r>
+              <a:rPr lang="zh-CN" altLang="en-US" sz="3200" dirty="0">
+                <a:solidFill>
+                  <a:prstClr val="black">
+                    <a:lumMod val="95000"/>
+                    <a:lumOff val="5000"/>
+                  </a:prstClr>
+                </a:solidFill>
+              </a:rPr>
+              <a:t>马伊俐</a:t>
+            </a:r>
+            <a:r>
+              <a:rPr lang="en-US" altLang="zh-CN" sz="3200" dirty="0">
+                <a:solidFill>
+                  <a:prstClr val="black">
+                    <a:lumMod val="95000"/>
+                    <a:lumOff val="5000"/>
+                  </a:prstClr>
+                </a:solidFill>
+              </a:rPr>
+              <a:t>_19970188</a:t>
+            </a:r>
+          </a:p>
+          <a:p>
+            <a:pPr marL="457200" lvl="0" indent="-457200">
+              <a:buFont typeface="Wingdings" panose="05000000000000000000" pitchFamily="2" charset="2"/>
+              <a:buChar char="l"/>
+            </a:pPr>
+            <a:r>
+              <a:rPr lang="en-US" altLang="zh-CN" sz="3200" dirty="0">
+                <a:solidFill>
+                  <a:prstClr val="black">
+                    <a:lumMod val="95000"/>
+                    <a:lumOff val="5000"/>
+                  </a:prstClr>
+                </a:solidFill>
+              </a:rPr>
+              <a:t>Send it as attachment to </a:t>
+            </a:r>
+          </a:p>
+          <a:p>
+            <a:pPr lvl="0"/>
+            <a:r>
+              <a:rPr lang="en-US" altLang="zh-CN" sz="3200" dirty="0">
+                <a:solidFill>
+                  <a:prstClr val="black">
+                    <a:lumMod val="95000"/>
+                    <a:lumOff val="5000"/>
+                  </a:prstClr>
+                </a:solidFill>
+              </a:rPr>
+              <a:t>	</a:t>
+            </a:r>
+            <a:r>
+              <a:rPr lang="en-US" altLang="zh-CN" sz="3200" dirty="0" smtClean="0">
+                <a:solidFill>
+                  <a:prstClr val="black">
+                    <a:lumMod val="95000"/>
+                    <a:lumOff val="5000"/>
+                  </a:prstClr>
+                </a:solidFill>
+                <a:hlinkClick r:id="rId3"/>
+              </a:rPr>
+              <a:t>assignments.shmtu@gmail.com</a:t>
+            </a:r>
+            <a:r>
+              <a:rPr lang="en-US" altLang="zh-CN" sz="3200" dirty="0" smtClean="0">
+                <a:solidFill>
+                  <a:prstClr val="black">
+                    <a:lumMod val="95000"/>
+                    <a:lumOff val="5000"/>
+                  </a:prstClr>
+                </a:solidFill>
+              </a:rPr>
+              <a:t> </a:t>
+            </a:r>
+            <a:endParaRPr lang="en-US" altLang="zh-CN" sz="3200" dirty="0">
+              <a:solidFill>
+                <a:prstClr val="black">
+                  <a:lumMod val="95000"/>
+                  <a:lumOff val="5000"/>
+                </a:prstClr>
+              </a:solidFill>
+            </a:endParaRPr>
+          </a:p>
+          <a:p>
+            <a:pPr marL="457200" lvl="0" indent="-457200">
+              <a:buFont typeface="Wingdings" panose="05000000000000000000" pitchFamily="2" charset="2"/>
+              <a:buChar char="l"/>
+            </a:pPr>
+            <a:r>
+              <a:rPr lang="en-US" altLang="zh-CN" sz="3200" dirty="0">
+                <a:solidFill>
+                  <a:prstClr val="black">
+                    <a:lumMod val="95000"/>
+                    <a:lumOff val="5000"/>
+                  </a:prstClr>
+                </a:solidFill>
+              </a:rPr>
+              <a:t>The subject of the email should be the same as the </a:t>
+            </a:r>
+            <a:r>
+              <a:rPr lang="en-US" altLang="zh-CN" sz="3200" dirty="0" smtClean="0">
+                <a:solidFill>
+                  <a:prstClr val="black">
+                    <a:lumMod val="95000"/>
+                    <a:lumOff val="5000"/>
+                  </a:prstClr>
+                </a:solidFill>
+              </a:rPr>
+              <a:t>title </a:t>
+            </a:r>
+            <a:r>
+              <a:rPr lang="en-US" altLang="zh-CN" sz="3200" dirty="0">
+                <a:solidFill>
+                  <a:prstClr val="black">
+                    <a:lumMod val="95000"/>
+                    <a:lumOff val="5000"/>
+                  </a:prstClr>
+                </a:solidFill>
+              </a:rPr>
+              <a:t>of your attachment.</a:t>
+            </a:r>
+          </a:p>
+          <a:p>
+            <a:pPr marL="457200" lvl="0" indent="-457200">
+              <a:buFont typeface="Wingdings" panose="05000000000000000000" pitchFamily="2" charset="2"/>
+              <a:buChar char="l"/>
+            </a:pPr>
+            <a:r>
+              <a:rPr lang="en-US" altLang="zh-CN" sz="3200" dirty="0">
+                <a:solidFill>
+                  <a:prstClr val="black">
+                    <a:lumMod val="95000"/>
+                    <a:lumOff val="5000"/>
+                  </a:prstClr>
+                </a:solidFill>
+              </a:rPr>
+              <a:t>Any email with mismatched formats will be </a:t>
+            </a:r>
+            <a:r>
+              <a:rPr lang="en-US" altLang="zh-CN" sz="3200" dirty="0" smtClean="0">
+                <a:solidFill>
+                  <a:prstClr val="black">
+                    <a:lumMod val="95000"/>
+                    <a:lumOff val="5000"/>
+                  </a:prstClr>
+                </a:solidFill>
+              </a:rPr>
+              <a:t>identified as </a:t>
+            </a:r>
+            <a:r>
+              <a:rPr lang="en-US" altLang="zh-CN" sz="3200" dirty="0">
+                <a:solidFill>
+                  <a:prstClr val="black">
+                    <a:lumMod val="95000"/>
+                    <a:lumOff val="5000"/>
+                  </a:prstClr>
+                </a:solidFill>
+              </a:rPr>
+              <a:t>SPAM.</a:t>
+            </a:r>
+            <a:endParaRPr lang="en-US" altLang="zh-CN" sz="3200" dirty="0">
+              <a:solidFill>
+                <a:prstClr val="black">
+                  <a:lumMod val="95000"/>
+                  <a:lumOff val="5000"/>
+                </a:prstClr>
+              </a:solidFill>
+            </a:endParaRPr>
+          </a:p>
+        </p:txBody>
+      </p:sp>
+      <p:pic>
+        <p:nvPicPr>
+          <p:cNvPr id="8" name="图片 7"/>
+          <p:cNvPicPr>
+            <a:picLocks noChangeAspect="1"/>
+          </p:cNvPicPr>
+          <p:nvPr/>
+        </p:nvPicPr>
+        <p:blipFill>
+          <a:blip r:embed="rId4">
+            <a:extLst>
+              <a:ext uri="{28A0092B-C50C-407E-A947-70E740481C1C}">
+                <a14:useLocalDpi xmlns:a14="http://schemas.microsoft.com/office/drawing/2010/main" val="0"/>
+              </a:ext>
+            </a:extLst>
+          </a:blip>
+          <a:stretch>
+            <a:fillRect/>
+          </a:stretch>
+        </p:blipFill>
+        <p:spPr>
+          <a:xfrm>
+            <a:off x="6174297" y="0"/>
+            <a:ext cx="2908397" cy="2908397"/>
+          </a:xfrm>
+          <a:prstGeom prst="rect">
+            <a:avLst/>
+          </a:prstGeom>
+        </p:spPr>
+      </p:pic>
     </p:spTree>
     <p:extLst>
       <p:ext uri="{BB962C8B-B14F-4D97-AF65-F5344CB8AC3E}">
@@ -7169,13 +7388,13 @@
   <p:clrMapOvr>
     <a:masterClrMapping/>
   </p:clrMapOvr>
-  <mc:AlternateContent xmlns:mc="http://schemas.openxmlformats.org/markup-compatibility/2006">
-    <mc:Choice xmlns:p15="http://schemas.microsoft.com/office/powerpoint/2012/main" Requires="p15">
+  <mc:AlternateContent xmlns:mc="http://schemas.openxmlformats.org/markup-compatibility/2006" xmlns:p15="http://schemas.microsoft.com/office/powerpoint/2012/main">
+    <mc:Choice Requires="p15">
       <p:transition xmlns:p14="http://schemas.microsoft.com/office/powerpoint/2010/main" spd="slow" p14:dur="2000">
         <p15:prstTrans prst="fallOver"/>
       </p:transition>
     </mc:Choice>
-    <mc:Fallback>
+    <mc:Fallback xmlns="">
       <p:transition spd="slow">
         <p:fade/>
       </p:transition>

</xml_diff>

<commit_message>
Fix bugs in Lec.6.
</commit_message>
<xml_diff>
--- a/Assignments/A1/1#Assignment.pptx
+++ b/Assignments/A1/1#Assignment.pptx
@@ -207,7 +207,7 @@
           <a:p>
             <a:fld id="{AA66A5E4-2F90-4B56-BDEB-27100CBC5233}" type="datetimeFigureOut">
               <a:rPr lang="zh-CN" altLang="en-US" smtClean="0"/>
-              <a:t>2014/4/8</a:t>
+              <a:t>2014/4/24</a:t>
             </a:fld>
             <a:endParaRPr lang="zh-CN" altLang="en-US"/>
           </a:p>
@@ -1026,7 +1026,7 @@
           <a:p>
             <a:fld id="{4BBE7AE2-8C73-4028-8151-77B8842EA71D}" type="datetimeFigureOut">
               <a:rPr lang="zh-CN" altLang="en-US" smtClean="0"/>
-              <a:t>2014/4/8</a:t>
+              <a:t>2014/4/24</a:t>
             </a:fld>
             <a:endParaRPr lang="zh-CN" altLang="en-US"/>
           </a:p>
@@ -1196,7 +1196,7 @@
           <a:p>
             <a:fld id="{4BBE7AE2-8C73-4028-8151-77B8842EA71D}" type="datetimeFigureOut">
               <a:rPr lang="zh-CN" altLang="en-US" smtClean="0"/>
-              <a:t>2014/4/8</a:t>
+              <a:t>2014/4/24</a:t>
             </a:fld>
             <a:endParaRPr lang="zh-CN" altLang="en-US"/>
           </a:p>
@@ -1376,7 +1376,7 @@
           <a:p>
             <a:fld id="{4BBE7AE2-8C73-4028-8151-77B8842EA71D}" type="datetimeFigureOut">
               <a:rPr lang="zh-CN" altLang="en-US" smtClean="0"/>
-              <a:t>2014/4/8</a:t>
+              <a:t>2014/4/24</a:t>
             </a:fld>
             <a:endParaRPr lang="zh-CN" altLang="en-US"/>
           </a:p>
@@ -1546,7 +1546,7 @@
           <a:p>
             <a:fld id="{4BBE7AE2-8C73-4028-8151-77B8842EA71D}" type="datetimeFigureOut">
               <a:rPr lang="zh-CN" altLang="en-US" smtClean="0"/>
-              <a:t>2014/4/8</a:t>
+              <a:t>2014/4/24</a:t>
             </a:fld>
             <a:endParaRPr lang="zh-CN" altLang="en-US"/>
           </a:p>
@@ -1790,7 +1790,7 @@
           <a:p>
             <a:fld id="{4BBE7AE2-8C73-4028-8151-77B8842EA71D}" type="datetimeFigureOut">
               <a:rPr lang="zh-CN" altLang="en-US" smtClean="0"/>
-              <a:t>2014/4/8</a:t>
+              <a:t>2014/4/24</a:t>
             </a:fld>
             <a:endParaRPr lang="zh-CN" altLang="en-US"/>
           </a:p>
@@ -2022,7 +2022,7 @@
           <a:p>
             <a:fld id="{4BBE7AE2-8C73-4028-8151-77B8842EA71D}" type="datetimeFigureOut">
               <a:rPr lang="zh-CN" altLang="en-US" smtClean="0"/>
-              <a:t>2014/4/8</a:t>
+              <a:t>2014/4/24</a:t>
             </a:fld>
             <a:endParaRPr lang="zh-CN" altLang="en-US"/>
           </a:p>
@@ -2389,7 +2389,7 @@
           <a:p>
             <a:fld id="{4BBE7AE2-8C73-4028-8151-77B8842EA71D}" type="datetimeFigureOut">
               <a:rPr lang="zh-CN" altLang="en-US" smtClean="0"/>
-              <a:t>2014/4/8</a:t>
+              <a:t>2014/4/24</a:t>
             </a:fld>
             <a:endParaRPr lang="zh-CN" altLang="en-US"/>
           </a:p>
@@ -2507,7 +2507,7 @@
           <a:p>
             <a:fld id="{4BBE7AE2-8C73-4028-8151-77B8842EA71D}" type="datetimeFigureOut">
               <a:rPr lang="zh-CN" altLang="en-US" smtClean="0"/>
-              <a:t>2014/4/8</a:t>
+              <a:t>2014/4/24</a:t>
             </a:fld>
             <a:endParaRPr lang="zh-CN" altLang="en-US"/>
           </a:p>
@@ -2602,7 +2602,7 @@
           <a:p>
             <a:fld id="{4BBE7AE2-8C73-4028-8151-77B8842EA71D}" type="datetimeFigureOut">
               <a:rPr lang="zh-CN" altLang="en-US" smtClean="0"/>
-              <a:t>2014/4/8</a:t>
+              <a:t>2014/4/24</a:t>
             </a:fld>
             <a:endParaRPr lang="zh-CN" altLang="en-US"/>
           </a:p>
@@ -2879,7 +2879,7 @@
           <a:p>
             <a:fld id="{4BBE7AE2-8C73-4028-8151-77B8842EA71D}" type="datetimeFigureOut">
               <a:rPr lang="zh-CN" altLang="en-US" smtClean="0"/>
-              <a:t>2014/4/8</a:t>
+              <a:t>2014/4/24</a:t>
             </a:fld>
             <a:endParaRPr lang="zh-CN" altLang="en-US"/>
           </a:p>
@@ -3136,7 +3136,7 @@
           <a:p>
             <a:fld id="{4BBE7AE2-8C73-4028-8151-77B8842EA71D}" type="datetimeFigureOut">
               <a:rPr lang="zh-CN" altLang="en-US" smtClean="0"/>
-              <a:t>2014/4/8</a:t>
+              <a:t>2014/4/24</a:t>
             </a:fld>
             <a:endParaRPr lang="zh-CN" altLang="en-US"/>
           </a:p>
@@ -3349,7 +3349,7 @@
           <a:p>
             <a:fld id="{4BBE7AE2-8C73-4028-8151-77B8842EA71D}" type="datetimeFigureOut">
               <a:rPr lang="zh-CN" altLang="en-US" smtClean="0"/>
-              <a:t>2014/4/8</a:t>
+              <a:t>2014/4/24</a:t>
             </a:fld>
             <a:endParaRPr lang="zh-CN" altLang="en-US"/>
           </a:p>
@@ -3991,7 +3991,7 @@
       </p:grpSpPr>
       <p:sp>
         <p:nvSpPr>
-          <p:cNvPr id="5" name="Title 1"/>
+          <p:cNvPr id="6" name="Title 1"/>
           <p:cNvSpPr txBox="1">
             <a:spLocks/>
           </p:cNvSpPr>
@@ -3999,7 +3999,7 @@
         </p:nvSpPr>
         <p:spPr>
           <a:xfrm>
-            <a:off x="403090" y="1812511"/>
+            <a:off x="359547" y="1647048"/>
             <a:ext cx="8455683" cy="4378564"/>
           </a:xfrm>
           <a:prstGeom prst="rect">
@@ -4050,6 +4050,21 @@
               <a:buChar char="l"/>
             </a:pPr>
             <a:r>
+              <a:rPr lang="en-US" sz="3200" b="1" dirty="0" smtClean="0">
+                <a:solidFill>
+                  <a:srgbClr val="FF0000"/>
+                </a:solidFill>
+                <a:latin typeface="+mn-lt"/>
+              </a:rPr>
+              <a:t>DON’T share your source code with others, otherwise ZERO score will be given.</a:t>
+            </a:r>
+          </a:p>
+          <a:p>
+            <a:pPr marL="457200" indent="-457200">
+              <a:buFont typeface="Wingdings" panose="05000000000000000000" pitchFamily="2" charset="2"/>
+              <a:buChar char="l"/>
+            </a:pPr>
+            <a:r>
               <a:rPr lang="en-US" sz="3200" dirty="0" smtClean="0">
                 <a:latin typeface="+mn-lt"/>
               </a:rPr>
@@ -4062,7 +4077,7 @@
               <a:buAutoNum type="romanUcPeriod"/>
             </a:pPr>
             <a:r>
-              <a:rPr lang="en-US" sz="3200" dirty="0" smtClean="0">
+              <a:rPr lang="en-US" sz="2800" dirty="0" smtClean="0">
                 <a:latin typeface="+mn-lt"/>
               </a:rPr>
               <a:t>With the exactly same codes or documents</a:t>
@@ -4074,19 +4089,19 @@
               <a:buAutoNum type="romanUcPeriod"/>
             </a:pPr>
             <a:r>
-              <a:rPr lang="en-US" sz="3200" dirty="0" smtClean="0">
+              <a:rPr lang="en-US" sz="2800" dirty="0" smtClean="0">
                 <a:latin typeface="+mn-lt"/>
               </a:rPr>
               <a:t>If two copies are same, the one sent later is considered </a:t>
             </a:r>
             <a:r>
-              <a:rPr lang="en-US" sz="3200" dirty="0">
+              <a:rPr lang="en-US" sz="2800" dirty="0">
                 <a:latin typeface="+mn-lt"/>
               </a:rPr>
               <a:t>as </a:t>
             </a:r>
             <a:r>
-              <a:rPr lang="en-US" sz="3200" dirty="0" smtClean="0">
+              <a:rPr lang="en-US" sz="2800" dirty="0" smtClean="0">
                 <a:latin typeface="+mn-lt"/>
               </a:rPr>
               <a:t>plagiarizer. Here, ‘later’ is judged based on the coming time of its email.</a:t>
@@ -4098,20 +4113,11 @@
               <a:buAutoNum type="romanUcPeriod"/>
             </a:pPr>
             <a:r>
-              <a:rPr lang="en-US" sz="3200" dirty="0" smtClean="0">
+              <a:rPr lang="en-US" sz="2800" dirty="0" smtClean="0">
                 <a:latin typeface="+mn-lt"/>
               </a:rPr>
               <a:t>Student will be assigned randomly to present his (her) codes on class.</a:t>
             </a:r>
-          </a:p>
-          <a:p>
-            <a:pPr marL="571500" indent="-571500">
-              <a:buFont typeface="+mj-lt"/>
-              <a:buAutoNum type="romanUcPeriod"/>
-            </a:pPr>
-            <a:endParaRPr lang="en-US" sz="3200" dirty="0" smtClean="0">
-              <a:latin typeface="+mn-lt"/>
-            </a:endParaRPr>
           </a:p>
           <a:p>
             <a:pPr marL="457200" indent="-457200">
@@ -4155,7 +4161,7 @@
       </p:sp>
       <p:cxnSp>
         <p:nvCxnSpPr>
-          <p:cNvPr id="3" name="直接连接符 2"/>
+          <p:cNvPr id="8" name="直接连接符 7"/>
           <p:cNvCxnSpPr/>
           <p:nvPr/>
         </p:nvCxnSpPr>
@@ -4197,7 +4203,7 @@
       </p:cxnSp>
       <p:sp>
         <p:nvSpPr>
-          <p:cNvPr id="7" name="文本框 6"/>
+          <p:cNvPr id="9" name="文本框 8"/>
           <p:cNvSpPr txBox="1"/>
           <p:nvPr/>
         </p:nvSpPr>
@@ -5215,11 +5221,11 @@
   <p:clrMapOvr>
     <a:masterClrMapping/>
   </p:clrMapOvr>
-  <mc:AlternateContent xmlns:mc="http://schemas.openxmlformats.org/markup-compatibility/2006">
-    <mc:Choice xmlns:p14="http://schemas.microsoft.com/office/powerpoint/2010/main" Requires="p14">
+  <mc:AlternateContent xmlns:mc="http://schemas.openxmlformats.org/markup-compatibility/2006" xmlns:p14="http://schemas.microsoft.com/office/powerpoint/2010/main">
+    <mc:Choice Requires="p14">
       <p:transition p14:dur="0"/>
     </mc:Choice>
-    <mc:Fallback>
+    <mc:Fallback xmlns="">
       <p:transition/>
     </mc:Fallback>
   </mc:AlternateContent>
@@ -5998,31 +6004,7 @@
                 </a:solidFill>
                 <a:latin typeface="+mn-lt"/>
               </a:rPr>
-              <a:t>, </a:t>
-            </a:r>
-            <a:r>
-              <a:rPr lang="en-US" sz="3200" dirty="0" smtClean="0">
-                <a:solidFill>
-                  <a:schemeClr val="tx1">
-                    <a:lumMod val="95000"/>
-                    <a:lumOff val="5000"/>
-                  </a:schemeClr>
-                </a:solidFill>
-                <a:latin typeface="+mn-lt"/>
-              </a:rPr>
-              <a:t>addressed in </a:t>
-            </a:r>
-            <a:r>
-              <a:rPr lang="en-US" sz="3200" dirty="0" smtClean="0">
-                <a:solidFill>
-                  <a:schemeClr val="tx1">
-                    <a:lumMod val="95000"/>
-                    <a:lumOff val="5000"/>
-                  </a:schemeClr>
-                </a:solidFill>
-                <a:latin typeface="+mn-lt"/>
-              </a:rPr>
-              <a:t>lectures should be demonstrated in your implementation</a:t>
+              <a:t>, addressed in lectures should be demonstrated in your implementation</a:t>
             </a:r>
           </a:p>
           <a:p>
@@ -6614,19 +6596,7 @@
                 </a:solidFill>
                 <a:latin typeface="+mn-lt"/>
               </a:rPr>
-              <a:t> </a:t>
-            </a:r>
-            <a:r>
-              <a:rPr lang="en-US" sz="3200" dirty="0" smtClean="0">
-                <a:solidFill>
-                  <a:schemeClr val="tx1">
-                    <a:lumMod val="95000"/>
-                    <a:lumOff val="5000"/>
-                  </a:schemeClr>
-                </a:solidFill>
-                <a:latin typeface="+mn-lt"/>
-              </a:rPr>
-              <a:t>sense and </a:t>
+              <a:t> sense and </a:t>
             </a:r>
             <a:r>
               <a:rPr lang="en-US" sz="3200" b="1" i="1" dirty="0" smtClean="0">
@@ -6915,31 +6885,7 @@
                 </a:solidFill>
                 <a:latin typeface="+mn-lt"/>
               </a:rPr>
-              <a:t>Package your codes and </a:t>
-            </a:r>
-            <a:r>
-              <a:rPr lang="en-US" sz="3200" dirty="0" smtClean="0">
-                <a:solidFill>
-                  <a:schemeClr val="tx1">
-                    <a:lumMod val="95000"/>
-                    <a:lumOff val="5000"/>
-                  </a:schemeClr>
-                </a:solidFill>
-                <a:latin typeface="+mn-lt"/>
-              </a:rPr>
-              <a:t>document </a:t>
-            </a:r>
-            <a:r>
-              <a:rPr lang="en-US" sz="3200" dirty="0" smtClean="0">
-                <a:solidFill>
-                  <a:schemeClr val="tx1">
-                    <a:lumMod val="95000"/>
-                    <a:lumOff val="5000"/>
-                  </a:schemeClr>
-                </a:solidFill>
-                <a:latin typeface="+mn-lt"/>
-              </a:rPr>
-              <a:t>in a single compressed file titled as:</a:t>
+              <a:t>Package your codes and document in a single compressed file titled as:</a:t>
             </a:r>
           </a:p>
           <a:p>
@@ -7337,14 +7283,6 @@
               </a:rPr>
               <a:t>SPAM.</a:t>
             </a:r>
-            <a:endParaRPr lang="en-US" altLang="zh-CN" sz="3200" dirty="0">
-              <a:solidFill>
-                <a:prstClr val="black">
-                  <a:lumMod val="95000"/>
-                  <a:lumOff val="5000"/>
-                </a:prstClr>
-              </a:solidFill>
-            </a:endParaRPr>
           </a:p>
         </p:txBody>
       </p:sp>

</xml_diff>